<commit_message>
adds GraphQL Client slides
</commit_message>
<xml_diff>
--- a/slides/HotChocolate_Part_3.pptx
+++ b/slides/HotChocolate_Part_3.pptx
@@ -5,7 +5,7 @@
     <p:sldMasterId id="2147483648" r:id="rId1"/>
   </p:sldMasterIdLst>
   <p:notesMasterIdLst>
-    <p:notesMasterId r:id="rId10"/>
+    <p:notesMasterId r:id="rId11"/>
   </p:notesMasterIdLst>
   <p:sldIdLst>
     <p:sldId id="256" r:id="rId2"/>
@@ -13,9 +13,10 @@
     <p:sldId id="262" r:id="rId4"/>
     <p:sldId id="305" r:id="rId5"/>
     <p:sldId id="306" r:id="rId6"/>
-    <p:sldId id="307" r:id="rId7"/>
-    <p:sldId id="303" r:id="rId8"/>
-    <p:sldId id="287" r:id="rId9"/>
+    <p:sldId id="303" r:id="rId7"/>
+    <p:sldId id="307" r:id="rId8"/>
+    <p:sldId id="308" r:id="rId9"/>
+    <p:sldId id="287" r:id="rId10"/>
   </p:sldIdLst>
   <p:sldSz cx="12192000" cy="6858000"/>
   <p:notesSz cx="6858000" cy="9144000"/>
@@ -204,7 +205,7 @@
           <a:p>
             <a:fld id="{96C061DB-C9A5-E144-8B8D-A9F91D0FE356}" type="datetimeFigureOut">
               <a:rPr lang="de-DE" smtClean="0"/>
-              <a:t>01.12.21</a:t>
+              <a:t>02.12.2021</a:t>
             </a:fld>
             <a:endParaRPr lang="de-DE"/>
           </a:p>
@@ -6210,19 +6211,25 @@
           <a:bodyPr anchor="b"/>
           <a:lstStyle/>
           <a:p>
-            <a:pPr>
-              <a:lnSpc>
-                <a:spcPct val="150000"/>
-              </a:lnSpc>
-            </a:pPr>
-            <a:r>
-              <a:rPr lang="de-DE" dirty="0" err="1"/>
-              <a:t>Strawberry</a:t>
-            </a:r>
-            <a:r>
-              <a:rPr lang="de-DE" dirty="0"/>
-              <a:t> Shake</a:t>
-            </a:r>
+            <a:r>
+              <a:rPr lang="en-US" dirty="0">
+                <a:solidFill>
+                  <a:schemeClr val="tx1">
+                    <a:lumMod val="75000"/>
+                    <a:lumOff val="25000"/>
+                  </a:schemeClr>
+                </a:solidFill>
+              </a:rPr>
+              <a:t>👷‍♂️ Challenge #5: Subscriptions</a:t>
+            </a:r>
+            <a:endParaRPr lang="de-DE" dirty="0">
+              <a:solidFill>
+                <a:schemeClr val="tx1">
+                  <a:lumMod val="75000"/>
+                  <a:lumOff val="25000"/>
+                </a:schemeClr>
+              </a:solidFill>
+            </a:endParaRPr>
           </a:p>
         </p:txBody>
       </p:sp>
@@ -6297,8 +6304,8 @@
         </p:nvSpPr>
         <p:spPr>
           <a:xfrm>
-            <a:off x="1533236" y="1918554"/>
-            <a:ext cx="9190259" cy="369332"/>
+            <a:off x="2409275" y="1831446"/>
+            <a:ext cx="2207656" cy="369332"/>
           </a:xfrm>
           <a:prstGeom prst="rect">
             <a:avLst/>
@@ -6306,13 +6313,13 @@
           <a:noFill/>
         </p:spPr>
         <p:txBody>
-          <a:bodyPr wrap="square" rtlCol="0">
+          <a:bodyPr wrap="none" rtlCol="0">
             <a:spAutoFit/>
           </a:bodyPr>
           <a:lstStyle/>
           <a:p>
             <a:r>
-              <a:rPr lang="en-GB">
+              <a:rPr lang="en-GB" b="1" dirty="0">
                 <a:solidFill>
                   <a:schemeClr val="tx1">
                     <a:lumMod val="75000"/>
@@ -6321,15 +6328,171 @@
                 </a:solidFill>
                 <a:latin typeface="Raleway" pitchFamily="2" charset="77"/>
               </a:rPr>
-              <a:t>TBD</a:t>
-            </a:r>
-            <a:endParaRPr lang="en-GB" b="1" dirty="0">
-              <a:solidFill>
-                <a:schemeClr val="tx1">
-                  <a:lumMod val="75000"/>
-                  <a:lumOff val="25000"/>
-                </a:schemeClr>
-              </a:solidFill>
+              <a:t>Now it's your turn!</a:t>
+            </a:r>
+          </a:p>
+        </p:txBody>
+      </p:sp>
+      <p:sp>
+        <p:nvSpPr>
+          <p:cNvPr id="5" name="Textfeld 11">
+            <a:extLst>
+              <a:ext uri="{FF2B5EF4-FFF2-40B4-BE49-F238E27FC236}">
+                <a16:creationId xmlns:a16="http://schemas.microsoft.com/office/drawing/2014/main" id="{C0DD3512-D4C7-934A-BD03-C17E14DCFF8F}"/>
+              </a:ext>
+            </a:extLst>
+          </p:cNvPr>
+          <p:cNvSpPr txBox="1"/>
+          <p:nvPr/>
+        </p:nvSpPr>
+        <p:spPr>
+          <a:xfrm>
+            <a:off x="2409275" y="2656646"/>
+            <a:ext cx="7661072" cy="459165"/>
+          </a:xfrm>
+          <a:prstGeom prst="rect">
+            <a:avLst/>
+          </a:prstGeom>
+          <a:noFill/>
+        </p:spPr>
+        <p:txBody>
+          <a:bodyPr wrap="none" rtlCol="0">
+            <a:spAutoFit/>
+          </a:bodyPr>
+          <a:lstStyle/>
+          <a:p>
+            <a:pPr>
+              <a:lnSpc>
+                <a:spcPct val="150000"/>
+              </a:lnSpc>
+            </a:pPr>
+            <a:r>
+              <a:rPr lang="en-GB" dirty="0">
+                <a:solidFill>
+                  <a:schemeClr val="tx1">
+                    <a:lumMod val="75000"/>
+                    <a:lumOff val="25000"/>
+                  </a:schemeClr>
+                </a:solidFill>
+                <a:latin typeface="Raleway" pitchFamily="2" charset="77"/>
+              </a:rPr>
+              <a:t>In this exercise you learn to implement subscriptions in Hot Chocolate</a:t>
+            </a:r>
+          </a:p>
+        </p:txBody>
+      </p:sp>
+      <p:pic>
+        <p:nvPicPr>
+          <p:cNvPr id="4098" name="Picture 2" descr="Github logo - Kostenlose sozialen medien Icons">
+            <a:extLst>
+              <a:ext uri="{FF2B5EF4-FFF2-40B4-BE49-F238E27FC236}">
+                <a16:creationId xmlns:a16="http://schemas.microsoft.com/office/drawing/2014/main" id="{ED808690-24B8-4E4F-BEE8-C629063FA87E}"/>
+              </a:ext>
+            </a:extLst>
+          </p:cNvPr>
+          <p:cNvPicPr>
+            <a:picLocks noChangeAspect="1" noChangeArrowheads="1"/>
+          </p:cNvPicPr>
+          <p:nvPr/>
+        </p:nvPicPr>
+        <p:blipFill>
+          <a:blip r:embed="rId2">
+            <a:extLst>
+              <a:ext uri="{28A0092B-C50C-407E-A947-70E740481C1C}">
+                <a14:useLocalDpi xmlns:a14="http://schemas.microsoft.com/office/drawing/2010/main" val="0"/>
+              </a:ext>
+            </a:extLst>
+          </a:blip>
+          <a:srcRect/>
+          <a:stretch>
+            <a:fillRect/>
+          </a:stretch>
+        </p:blipFill>
+        <p:spPr bwMode="auto">
+          <a:xfrm>
+            <a:off x="2469312" y="4615788"/>
+            <a:ext cx="549482" cy="549482"/>
+          </a:xfrm>
+          <a:prstGeom prst="rect">
+            <a:avLst/>
+          </a:prstGeom>
+          <a:noFill/>
+          <a:extLst>
+            <a:ext uri="{909E8E84-426E-40DD-AFC4-6F175D3DCCD1}">
+              <a14:hiddenFill xmlns:a14="http://schemas.microsoft.com/office/drawing/2010/main">
+                <a:solidFill>
+                  <a:srgbClr val="FFFFFF"/>
+                </a:solidFill>
+              </a14:hiddenFill>
+            </a:ext>
+          </a:extLst>
+        </p:spPr>
+      </p:pic>
+      <p:sp>
+        <p:nvSpPr>
+          <p:cNvPr id="3" name="TextBox 2">
+            <a:extLst>
+              <a:ext uri="{FF2B5EF4-FFF2-40B4-BE49-F238E27FC236}">
+                <a16:creationId xmlns:a16="http://schemas.microsoft.com/office/drawing/2014/main" id="{8F202A11-8877-474A-85CA-44BC16F36F1C}"/>
+              </a:ext>
+            </a:extLst>
+          </p:cNvPr>
+          <p:cNvSpPr txBox="1"/>
+          <p:nvPr/>
+        </p:nvSpPr>
+        <p:spPr>
+          <a:xfrm>
+            <a:off x="3120550" y="4659696"/>
+            <a:ext cx="8815234" cy="461665"/>
+          </a:xfrm>
+          <a:prstGeom prst="rect">
+            <a:avLst/>
+          </a:prstGeom>
+          <a:noFill/>
+        </p:spPr>
+        <p:txBody>
+          <a:bodyPr wrap="none" rtlCol="0">
+            <a:spAutoFit/>
+          </a:bodyPr>
+          <a:lstStyle/>
+          <a:p>
+            <a:r>
+              <a:rPr lang="de-DE" sz="2400" dirty="0">
+                <a:latin typeface="Raleway" pitchFamily="2" charset="77"/>
+              </a:rPr>
+              <a:t>https://</a:t>
+            </a:r>
+            <a:r>
+              <a:rPr lang="de-DE" sz="2400" dirty="0" err="1">
+                <a:latin typeface="Raleway" pitchFamily="2" charset="77"/>
+              </a:rPr>
+              <a:t>github.com</a:t>
+            </a:r>
+            <a:r>
+              <a:rPr lang="de-DE" sz="2400" dirty="0">
+                <a:latin typeface="Raleway" pitchFamily="2" charset="77"/>
+              </a:rPr>
+              <a:t>/</a:t>
+            </a:r>
+            <a:r>
+              <a:rPr lang="de-DE" sz="2400" dirty="0" err="1">
+                <a:latin typeface="Raleway" pitchFamily="2" charset="77"/>
+              </a:rPr>
+              <a:t>CloudKlabauter</a:t>
+            </a:r>
+            <a:r>
+              <a:rPr lang="de-DE" sz="2400" dirty="0">
+                <a:latin typeface="Raleway" pitchFamily="2" charset="77"/>
+              </a:rPr>
+              <a:t>/</a:t>
+            </a:r>
+            <a:r>
+              <a:rPr lang="de-DE" sz="2400" dirty="0" err="1">
+                <a:latin typeface="Raleway" pitchFamily="2" charset="77"/>
+              </a:rPr>
+              <a:t>HotChocolateWorkshop</a:t>
+            </a:r>
+            <a:endParaRPr lang="de-DE" sz="2400" dirty="0">
               <a:latin typeface="Raleway" pitchFamily="2" charset="77"/>
             </a:endParaRPr>
           </a:p>
@@ -6338,7 +6501,7 @@
     </p:spTree>
     <p:extLst>
       <p:ext uri="{BB962C8B-B14F-4D97-AF65-F5344CB8AC3E}">
-        <p14:creationId xmlns:p14="http://schemas.microsoft.com/office/powerpoint/2010/main" val="1207660354"/>
+        <p14:creationId xmlns:p14="http://schemas.microsoft.com/office/powerpoint/2010/main" val="3451656233"/>
       </p:ext>
     </p:extLst>
   </p:cSld>
@@ -6386,115 +6549,146 @@
           <a:bodyPr anchor="b"/>
           <a:lstStyle/>
           <a:p>
-            <a:r>
-              <a:rPr lang="en-US" dirty="0">
+            <a:pPr>
+              <a:lnSpc>
+                <a:spcPct val="150000"/>
+              </a:lnSpc>
+            </a:pPr>
+            <a:r>
+              <a:rPr lang="de-DE" dirty="0" err="1"/>
+              <a:t>Strawberry</a:t>
+            </a:r>
+            <a:r>
+              <a:rPr lang="de-DE" dirty="0"/>
+              <a:t> Shake</a:t>
+            </a:r>
+          </a:p>
+        </p:txBody>
+      </p:sp>
+      <p:sp>
+        <p:nvSpPr>
+          <p:cNvPr id="4" name="Datumsplatzhalter 3">
+            <a:extLst>
+              <a:ext uri="{FF2B5EF4-FFF2-40B4-BE49-F238E27FC236}">
+                <a16:creationId xmlns:a16="http://schemas.microsoft.com/office/drawing/2014/main" id="{372D7581-15AB-453A-8172-2DD260D4AD01}"/>
+              </a:ext>
+            </a:extLst>
+          </p:cNvPr>
+          <p:cNvSpPr>
+            <a:spLocks noGrp="1"/>
+          </p:cNvSpPr>
+          <p:nvPr>
+            <p:ph type="dt" sz="half" idx="2"/>
+          </p:nvPr>
+        </p:nvSpPr>
+        <p:spPr>
+          <a:xfrm>
+            <a:off x="526625" y="6356350"/>
+            <a:ext cx="2743200" cy="365125"/>
+          </a:xfrm>
+          <a:prstGeom prst="rect">
+            <a:avLst/>
+          </a:prstGeom>
+        </p:spPr>
+        <p:txBody>
+          <a:bodyPr vert="horz" lIns="91440" tIns="45720" rIns="91440" bIns="45720" rtlCol="0" anchor="ctr"/>
+          <a:lstStyle>
+            <a:lvl1pPr algn="l">
+              <a:defRPr sz="1200">
+                <a:solidFill>
+                  <a:schemeClr val="tx1"/>
+                </a:solidFill>
+              </a:defRPr>
+            </a:lvl1pPr>
+          </a:lstStyle>
+          <a:p>
+            <a:fld id="{95CA576C-67C8-4CE2-9686-DB10934C823F}" type="slidenum">
+              <a:rPr lang="de-DE" b="1" smtClean="0"/>
+              <a:pPr/>
+              <a:t>7</a:t>
+            </a:fld>
+            <a:r>
+              <a:rPr lang="de-DE"/>
+              <a:t> </a:t>
+            </a:r>
+            <a:r>
+              <a:rPr lang="de-DE">
+                <a:solidFill>
+                  <a:srgbClr val="4F4F4F"/>
+                </a:solidFill>
+              </a:rPr>
+              <a:t>| cloudklabauter.de</a:t>
+            </a:r>
+          </a:p>
+        </p:txBody>
+      </p:sp>
+      <p:sp>
+        <p:nvSpPr>
+          <p:cNvPr id="6" name="Textfeld 11">
+            <a:extLst>
+              <a:ext uri="{FF2B5EF4-FFF2-40B4-BE49-F238E27FC236}">
+                <a16:creationId xmlns:a16="http://schemas.microsoft.com/office/drawing/2014/main" id="{017C06BF-161C-2046-B380-C974070FB5D7}"/>
+              </a:ext>
+            </a:extLst>
+          </p:cNvPr>
+          <p:cNvSpPr txBox="1"/>
+          <p:nvPr/>
+        </p:nvSpPr>
+        <p:spPr>
+          <a:xfrm>
+            <a:off x="1533236" y="1918554"/>
+            <a:ext cx="9190259" cy="2031325"/>
+          </a:xfrm>
+          <a:prstGeom prst="rect">
+            <a:avLst/>
+          </a:prstGeom>
+          <a:noFill/>
+        </p:spPr>
+        <p:txBody>
+          <a:bodyPr wrap="square" rtlCol="0">
+            <a:spAutoFit/>
+          </a:bodyPr>
+          <a:lstStyle/>
+          <a:p>
+            <a:r>
+              <a:rPr lang="en-GB" dirty="0" err="1">
                 <a:solidFill>
                   <a:schemeClr val="tx1">
                     <a:lumMod val="75000"/>
                     <a:lumOff val="25000"/>
                   </a:schemeClr>
                 </a:solidFill>
-              </a:rPr>
-              <a:t>👷‍♂️ Challenge #5: Subscriptions</a:t>
-            </a:r>
-            <a:endParaRPr lang="de-DE" dirty="0">
+                <a:latin typeface="Raleway" pitchFamily="2" charset="77"/>
+              </a:rPr>
+              <a:t>GraphQL</a:t>
+            </a:r>
+            <a:r>
+              <a:rPr lang="en-GB" dirty="0">
+                <a:solidFill>
+                  <a:schemeClr val="tx1">
+                    <a:lumMod val="75000"/>
+                    <a:lumOff val="25000"/>
+                  </a:schemeClr>
+                </a:solidFill>
+                <a:latin typeface="Raleway" pitchFamily="2" charset="77"/>
+              </a:rPr>
+              <a:t> Client library by the same team as Hot Chocolate</a:t>
+            </a:r>
+          </a:p>
+          <a:p>
+            <a:endParaRPr lang="en-GB" dirty="0">
               <a:solidFill>
                 <a:schemeClr val="tx1">
                   <a:lumMod val="75000"/>
                   <a:lumOff val="25000"/>
                 </a:schemeClr>
               </a:solidFill>
+              <a:latin typeface="Raleway" pitchFamily="2" charset="77"/>
             </a:endParaRPr>
           </a:p>
-        </p:txBody>
-      </p:sp>
-      <p:sp>
-        <p:nvSpPr>
-          <p:cNvPr id="4" name="Datumsplatzhalter 3">
-            <a:extLst>
-              <a:ext uri="{FF2B5EF4-FFF2-40B4-BE49-F238E27FC236}">
-                <a16:creationId xmlns:a16="http://schemas.microsoft.com/office/drawing/2014/main" id="{372D7581-15AB-453A-8172-2DD260D4AD01}"/>
-              </a:ext>
-            </a:extLst>
-          </p:cNvPr>
-          <p:cNvSpPr>
-            <a:spLocks noGrp="1"/>
-          </p:cNvSpPr>
-          <p:nvPr>
-            <p:ph type="dt" sz="half" idx="2"/>
-          </p:nvPr>
-        </p:nvSpPr>
-        <p:spPr>
-          <a:xfrm>
-            <a:off x="526625" y="6356350"/>
-            <a:ext cx="2743200" cy="365125"/>
-          </a:xfrm>
-          <a:prstGeom prst="rect">
-            <a:avLst/>
-          </a:prstGeom>
-        </p:spPr>
-        <p:txBody>
-          <a:bodyPr vert="horz" lIns="91440" tIns="45720" rIns="91440" bIns="45720" rtlCol="0" anchor="ctr"/>
-          <a:lstStyle>
-            <a:lvl1pPr algn="l">
-              <a:defRPr sz="1200">
-                <a:solidFill>
-                  <a:schemeClr val="tx1"/>
-                </a:solidFill>
-              </a:defRPr>
-            </a:lvl1pPr>
-          </a:lstStyle>
-          <a:p>
-            <a:fld id="{95CA576C-67C8-4CE2-9686-DB10934C823F}" type="slidenum">
-              <a:rPr lang="de-DE" b="1" smtClean="0"/>
-              <a:pPr/>
-              <a:t>7</a:t>
-            </a:fld>
-            <a:r>
-              <a:rPr lang="de-DE"/>
-              <a:t> </a:t>
-            </a:r>
-            <a:r>
-              <a:rPr lang="de-DE">
-                <a:solidFill>
-                  <a:srgbClr val="4F4F4F"/>
-                </a:solidFill>
-              </a:rPr>
-              <a:t>| cloudklabauter.de</a:t>
-            </a:r>
-          </a:p>
-        </p:txBody>
-      </p:sp>
-      <p:sp>
-        <p:nvSpPr>
-          <p:cNvPr id="6" name="Textfeld 11">
-            <a:extLst>
-              <a:ext uri="{FF2B5EF4-FFF2-40B4-BE49-F238E27FC236}">
-                <a16:creationId xmlns:a16="http://schemas.microsoft.com/office/drawing/2014/main" id="{017C06BF-161C-2046-B380-C974070FB5D7}"/>
-              </a:ext>
-            </a:extLst>
-          </p:cNvPr>
-          <p:cNvSpPr txBox="1"/>
-          <p:nvPr/>
-        </p:nvSpPr>
-        <p:spPr>
-          <a:xfrm>
-            <a:off x="2409275" y="1831446"/>
-            <a:ext cx="2207656" cy="369332"/>
-          </a:xfrm>
-          <a:prstGeom prst="rect">
-            <a:avLst/>
-          </a:prstGeom>
-          <a:noFill/>
-        </p:spPr>
-        <p:txBody>
-          <a:bodyPr wrap="none" rtlCol="0">
-            <a:spAutoFit/>
-          </a:bodyPr>
-          <a:lstStyle/>
-          <a:p>
-            <a:r>
-              <a:rPr lang="en-GB" b="1" dirty="0">
+          <a:p>
+            <a:r>
+              <a:rPr lang="en-GB" dirty="0">
                 <a:solidFill>
                   <a:schemeClr val="tx1">
                     <a:lumMod val="75000"/>
@@ -6503,46 +6697,10 @@
                 </a:solidFill>
                 <a:latin typeface="Raleway" pitchFamily="2" charset="77"/>
               </a:rPr>
-              <a:t>Now it's your turn!</a:t>
-            </a:r>
-          </a:p>
-        </p:txBody>
-      </p:sp>
-      <p:sp>
-        <p:nvSpPr>
-          <p:cNvPr id="5" name="Textfeld 11">
-            <a:extLst>
-              <a:ext uri="{FF2B5EF4-FFF2-40B4-BE49-F238E27FC236}">
-                <a16:creationId xmlns:a16="http://schemas.microsoft.com/office/drawing/2014/main" id="{C0DD3512-D4C7-934A-BD03-C17E14DCFF8F}"/>
-              </a:ext>
-            </a:extLst>
-          </p:cNvPr>
-          <p:cNvSpPr txBox="1"/>
-          <p:nvPr/>
-        </p:nvSpPr>
-        <p:spPr>
-          <a:xfrm>
-            <a:off x="2409275" y="2656646"/>
-            <a:ext cx="7661072" cy="459165"/>
-          </a:xfrm>
-          <a:prstGeom prst="rect">
-            <a:avLst/>
-          </a:prstGeom>
-          <a:noFill/>
-        </p:spPr>
-        <p:txBody>
-          <a:bodyPr wrap="none" rtlCol="0">
-            <a:spAutoFit/>
-          </a:bodyPr>
-          <a:lstStyle/>
-          <a:p>
-            <a:pPr>
-              <a:lnSpc>
-                <a:spcPct val="150000"/>
-              </a:lnSpc>
-            </a:pPr>
-            <a:r>
-              <a:rPr lang="en-GB" dirty="0">
+              <a:t>Supports newest </a:t>
+            </a:r>
+            <a:r>
+              <a:rPr lang="en-GB" dirty="0" err="1">
                 <a:solidFill>
                   <a:schemeClr val="tx1">
                     <a:lumMod val="75000"/>
@@ -6551,132 +6709,77 @@
                 </a:solidFill>
                 <a:latin typeface="Raleway" pitchFamily="2" charset="77"/>
               </a:rPr>
-              <a:t>In this exercise you learn to implement subscriptions in Hot Chocolate</a:t>
-            </a:r>
-          </a:p>
-        </p:txBody>
-      </p:sp>
-      <p:pic>
-        <p:nvPicPr>
-          <p:cNvPr id="4098" name="Picture 2" descr="Github logo - Kostenlose sozialen medien Icons">
-            <a:extLst>
-              <a:ext uri="{FF2B5EF4-FFF2-40B4-BE49-F238E27FC236}">
-                <a16:creationId xmlns:a16="http://schemas.microsoft.com/office/drawing/2014/main" id="{ED808690-24B8-4E4F-BEE8-C629063FA87E}"/>
-              </a:ext>
-            </a:extLst>
-          </p:cNvPr>
-          <p:cNvPicPr>
-            <a:picLocks noChangeAspect="1" noChangeArrowheads="1"/>
-          </p:cNvPicPr>
-          <p:nvPr/>
-        </p:nvPicPr>
-        <p:blipFill>
-          <a:blip r:embed="rId2">
-            <a:extLst>
-              <a:ext uri="{28A0092B-C50C-407E-A947-70E740481C1C}">
-                <a14:useLocalDpi xmlns:a14="http://schemas.microsoft.com/office/drawing/2010/main" val="0"/>
-              </a:ext>
-            </a:extLst>
-          </a:blip>
-          <a:srcRect/>
-          <a:stretch>
-            <a:fillRect/>
-          </a:stretch>
-        </p:blipFill>
-        <p:spPr bwMode="auto">
-          <a:xfrm>
-            <a:off x="2469312" y="4615788"/>
-            <a:ext cx="549482" cy="549482"/>
-          </a:xfrm>
-          <a:prstGeom prst="rect">
-            <a:avLst/>
-          </a:prstGeom>
-          <a:noFill/>
-          <a:extLst>
-            <a:ext uri="{909E8E84-426E-40DD-AFC4-6F175D3DCCD1}">
-              <a14:hiddenFill xmlns:a14="http://schemas.microsoft.com/office/drawing/2010/main">
-                <a:solidFill>
-                  <a:srgbClr val="FFFFFF"/>
-                </a:solidFill>
-              </a14:hiddenFill>
-            </a:ext>
-          </a:extLst>
-        </p:spPr>
-      </p:pic>
-      <p:sp>
-        <p:nvSpPr>
-          <p:cNvPr id="3" name="TextBox 2">
-            <a:extLst>
-              <a:ext uri="{FF2B5EF4-FFF2-40B4-BE49-F238E27FC236}">
-                <a16:creationId xmlns:a16="http://schemas.microsoft.com/office/drawing/2014/main" id="{8F202A11-8877-474A-85CA-44BC16F36F1C}"/>
-              </a:ext>
-            </a:extLst>
-          </p:cNvPr>
-          <p:cNvSpPr txBox="1"/>
-          <p:nvPr/>
-        </p:nvSpPr>
-        <p:spPr>
-          <a:xfrm>
-            <a:off x="3120550" y="4659696"/>
-            <a:ext cx="8815234" cy="461665"/>
-          </a:xfrm>
-          <a:prstGeom prst="rect">
-            <a:avLst/>
-          </a:prstGeom>
-          <a:noFill/>
-        </p:spPr>
-        <p:txBody>
-          <a:bodyPr wrap="none" rtlCol="0">
-            <a:spAutoFit/>
-          </a:bodyPr>
-          <a:lstStyle/>
-          <a:p>
-            <a:r>
-              <a:rPr lang="de-DE" sz="2400" dirty="0">
-                <a:latin typeface="Raleway" pitchFamily="2" charset="77"/>
-              </a:rPr>
-              <a:t>https://</a:t>
-            </a:r>
-            <a:r>
-              <a:rPr lang="de-DE" sz="2400" dirty="0" err="1">
-                <a:latin typeface="Raleway" pitchFamily="2" charset="77"/>
-              </a:rPr>
-              <a:t>github.com</a:t>
-            </a:r>
-            <a:r>
-              <a:rPr lang="de-DE" sz="2400" dirty="0">
-                <a:latin typeface="Raleway" pitchFamily="2" charset="77"/>
-              </a:rPr>
-              <a:t>/</a:t>
-            </a:r>
-            <a:r>
-              <a:rPr lang="de-DE" sz="2400" dirty="0" err="1">
-                <a:latin typeface="Raleway" pitchFamily="2" charset="77"/>
-              </a:rPr>
-              <a:t>CloudKlabauter</a:t>
-            </a:r>
-            <a:r>
-              <a:rPr lang="de-DE" sz="2400" dirty="0">
-                <a:latin typeface="Raleway" pitchFamily="2" charset="77"/>
-              </a:rPr>
-              <a:t>/</a:t>
-            </a:r>
-            <a:r>
-              <a:rPr lang="de-DE" sz="2400" dirty="0" err="1">
-                <a:latin typeface="Raleway" pitchFamily="2" charset="77"/>
-              </a:rPr>
-              <a:t>HotChocolateWorkshop</a:t>
-            </a:r>
-            <a:endParaRPr lang="de-DE" sz="2400" dirty="0">
+              <a:t>GraphQL</a:t>
+            </a:r>
+            <a:r>
+              <a:rPr lang="en-GB" dirty="0">
+                <a:solidFill>
+                  <a:schemeClr val="tx1">
+                    <a:lumMod val="75000"/>
+                    <a:lumOff val="25000"/>
+                  </a:schemeClr>
+                </a:solidFill>
+                <a:latin typeface="Raleway" pitchFamily="2" charset="77"/>
+              </a:rPr>
+              <a:t> draft spec</a:t>
+            </a:r>
+          </a:p>
+          <a:p>
+            <a:endParaRPr lang="en-GB" b="1" dirty="0">
+              <a:solidFill>
+                <a:schemeClr val="tx1">
+                  <a:lumMod val="75000"/>
+                  <a:lumOff val="25000"/>
+                </a:schemeClr>
+              </a:solidFill>
               <a:latin typeface="Raleway" pitchFamily="2" charset="77"/>
             </a:endParaRPr>
+          </a:p>
+          <a:p>
+            <a:r>
+              <a:rPr lang="en-GB" dirty="0">
+                <a:solidFill>
+                  <a:schemeClr val="tx1">
+                    <a:lumMod val="75000"/>
+                    <a:lumOff val="25000"/>
+                  </a:schemeClr>
+                </a:solidFill>
+                <a:latin typeface="Raleway" pitchFamily="2" charset="77"/>
+              </a:rPr>
+              <a:t>Creates a strongly typed C# client from queries, mutations etc.</a:t>
+            </a:r>
+          </a:p>
+          <a:p>
+            <a:endParaRPr lang="en-GB" dirty="0">
+              <a:solidFill>
+                <a:schemeClr val="tx1">
+                  <a:lumMod val="75000"/>
+                  <a:lumOff val="25000"/>
+                </a:schemeClr>
+              </a:solidFill>
+              <a:latin typeface="Raleway" pitchFamily="2" charset="77"/>
+            </a:endParaRPr>
+          </a:p>
+          <a:p>
+            <a:r>
+              <a:rPr lang="en-GB" dirty="0">
+                <a:solidFill>
+                  <a:schemeClr val="tx1">
+                    <a:lumMod val="75000"/>
+                    <a:lumOff val="25000"/>
+                  </a:schemeClr>
+                </a:solidFill>
+                <a:latin typeface="Raleway" pitchFamily="2" charset="77"/>
+              </a:rPr>
+              <a:t>Provides caching, persisted queries and state</a:t>
+            </a:r>
           </a:p>
         </p:txBody>
       </p:sp>
     </p:spTree>
     <p:extLst>
       <p:ext uri="{BB962C8B-B14F-4D97-AF65-F5344CB8AC3E}">
-        <p14:creationId xmlns:p14="http://schemas.microsoft.com/office/powerpoint/2010/main" val="3451656233"/>
+        <p14:creationId xmlns:p14="http://schemas.microsoft.com/office/powerpoint/2010/main" val="1207660354"/>
       </p:ext>
     </p:extLst>
   </p:cSld>
@@ -6725,7 +6828,7 @@
           <a:lstStyle/>
           <a:p>
             <a:r>
-              <a:rPr lang="de-DE" dirty="0" err="1">
+              <a:rPr lang="en-US" dirty="0">
                 <a:solidFill>
                   <a:schemeClr val="tx1">
                     <a:lumMod val="75000"/>
@@ -6733,10 +6836,10 @@
                   </a:schemeClr>
                 </a:solidFill>
               </a:rPr>
-              <a:t>Questions</a:t>
-            </a:r>
-            <a:r>
-              <a:rPr lang="de-DE" dirty="0">
+              <a:t>👷‍♂️ Challenge #7: </a:t>
+            </a:r>
+            <a:r>
+              <a:rPr lang="en-US" dirty="0" err="1">
                 <a:solidFill>
                   <a:schemeClr val="tx1">
                     <a:lumMod val="75000"/>
@@ -6744,8 +6847,27 @@
                   </a:schemeClr>
                 </a:solidFill>
               </a:rPr>
-              <a:t>?</a:t>
-            </a:r>
+              <a:t>GraphQL</a:t>
+            </a:r>
+            <a:r>
+              <a:rPr lang="en-US" dirty="0">
+                <a:solidFill>
+                  <a:schemeClr val="tx1">
+                    <a:lumMod val="75000"/>
+                    <a:lumOff val="25000"/>
+                  </a:schemeClr>
+                </a:solidFill>
+              </a:rPr>
+              <a:t> Client</a:t>
+            </a:r>
+            <a:endParaRPr lang="de-DE" dirty="0">
+              <a:solidFill>
+                <a:schemeClr val="tx1">
+                  <a:lumMod val="75000"/>
+                  <a:lumOff val="25000"/>
+                </a:schemeClr>
+              </a:solidFill>
+            </a:endParaRPr>
           </a:p>
         </p:txBody>
       </p:sp>
@@ -6790,6 +6912,371 @@
               <a:rPr lang="de-DE" b="1" smtClean="0"/>
               <a:pPr/>
               <a:t>8</a:t>
+            </a:fld>
+            <a:r>
+              <a:rPr lang="de-DE"/>
+              <a:t> </a:t>
+            </a:r>
+            <a:r>
+              <a:rPr lang="de-DE">
+                <a:solidFill>
+                  <a:srgbClr val="4F4F4F"/>
+                </a:solidFill>
+              </a:rPr>
+              <a:t>| cloudklabauter.de</a:t>
+            </a:r>
+          </a:p>
+        </p:txBody>
+      </p:sp>
+      <p:sp>
+        <p:nvSpPr>
+          <p:cNvPr id="6" name="Textfeld 11">
+            <a:extLst>
+              <a:ext uri="{FF2B5EF4-FFF2-40B4-BE49-F238E27FC236}">
+                <a16:creationId xmlns:a16="http://schemas.microsoft.com/office/drawing/2014/main" id="{017C06BF-161C-2046-B380-C974070FB5D7}"/>
+              </a:ext>
+            </a:extLst>
+          </p:cNvPr>
+          <p:cNvSpPr txBox="1"/>
+          <p:nvPr/>
+        </p:nvSpPr>
+        <p:spPr>
+          <a:xfrm>
+            <a:off x="2409275" y="1831446"/>
+            <a:ext cx="2207656" cy="369332"/>
+          </a:xfrm>
+          <a:prstGeom prst="rect">
+            <a:avLst/>
+          </a:prstGeom>
+          <a:noFill/>
+        </p:spPr>
+        <p:txBody>
+          <a:bodyPr wrap="none" rtlCol="0">
+            <a:spAutoFit/>
+          </a:bodyPr>
+          <a:lstStyle/>
+          <a:p>
+            <a:r>
+              <a:rPr lang="en-GB" b="1" dirty="0">
+                <a:solidFill>
+                  <a:schemeClr val="tx1">
+                    <a:lumMod val="75000"/>
+                    <a:lumOff val="25000"/>
+                  </a:schemeClr>
+                </a:solidFill>
+                <a:latin typeface="Raleway" pitchFamily="2" charset="77"/>
+              </a:rPr>
+              <a:t>Now it's your turn!</a:t>
+            </a:r>
+          </a:p>
+        </p:txBody>
+      </p:sp>
+      <p:sp>
+        <p:nvSpPr>
+          <p:cNvPr id="5" name="Textfeld 11">
+            <a:extLst>
+              <a:ext uri="{FF2B5EF4-FFF2-40B4-BE49-F238E27FC236}">
+                <a16:creationId xmlns:a16="http://schemas.microsoft.com/office/drawing/2014/main" id="{C0DD3512-D4C7-934A-BD03-C17E14DCFF8F}"/>
+              </a:ext>
+            </a:extLst>
+          </p:cNvPr>
+          <p:cNvSpPr txBox="1"/>
+          <p:nvPr/>
+        </p:nvSpPr>
+        <p:spPr>
+          <a:xfrm>
+            <a:off x="2409275" y="2656646"/>
+            <a:ext cx="8276625" cy="459165"/>
+          </a:xfrm>
+          <a:prstGeom prst="rect">
+            <a:avLst/>
+          </a:prstGeom>
+          <a:noFill/>
+        </p:spPr>
+        <p:txBody>
+          <a:bodyPr wrap="none" rtlCol="0">
+            <a:spAutoFit/>
+          </a:bodyPr>
+          <a:lstStyle/>
+          <a:p>
+            <a:pPr>
+              <a:lnSpc>
+                <a:spcPct val="150000"/>
+              </a:lnSpc>
+            </a:pPr>
+            <a:r>
+              <a:rPr lang="en-GB" dirty="0">
+                <a:solidFill>
+                  <a:schemeClr val="tx1">
+                    <a:lumMod val="75000"/>
+                    <a:lumOff val="25000"/>
+                  </a:schemeClr>
+                </a:solidFill>
+                <a:latin typeface="Raleway" pitchFamily="2" charset="77"/>
+              </a:rPr>
+              <a:t>In this exercise you learn to develop a </a:t>
+            </a:r>
+            <a:r>
+              <a:rPr lang="en-GB" dirty="0" err="1">
+                <a:solidFill>
+                  <a:schemeClr val="tx1">
+                    <a:lumMod val="75000"/>
+                    <a:lumOff val="25000"/>
+                  </a:schemeClr>
+                </a:solidFill>
+                <a:latin typeface="Raleway" pitchFamily="2" charset="77"/>
+              </a:rPr>
+              <a:t>GraphQL</a:t>
+            </a:r>
+            <a:r>
+              <a:rPr lang="en-GB" dirty="0">
+                <a:solidFill>
+                  <a:schemeClr val="tx1">
+                    <a:lumMod val="75000"/>
+                    <a:lumOff val="25000"/>
+                  </a:schemeClr>
+                </a:solidFill>
+                <a:latin typeface="Raleway" pitchFamily="2" charset="77"/>
+              </a:rPr>
+              <a:t> client with Strawberry Shake</a:t>
+            </a:r>
+          </a:p>
+        </p:txBody>
+      </p:sp>
+      <p:pic>
+        <p:nvPicPr>
+          <p:cNvPr id="4098" name="Picture 2" descr="Github logo - Kostenlose sozialen medien Icons">
+            <a:extLst>
+              <a:ext uri="{FF2B5EF4-FFF2-40B4-BE49-F238E27FC236}">
+                <a16:creationId xmlns:a16="http://schemas.microsoft.com/office/drawing/2014/main" id="{ED808690-24B8-4E4F-BEE8-C629063FA87E}"/>
+              </a:ext>
+            </a:extLst>
+          </p:cNvPr>
+          <p:cNvPicPr>
+            <a:picLocks noChangeAspect="1" noChangeArrowheads="1"/>
+          </p:cNvPicPr>
+          <p:nvPr/>
+        </p:nvPicPr>
+        <p:blipFill>
+          <a:blip r:embed="rId2">
+            <a:extLst>
+              <a:ext uri="{28A0092B-C50C-407E-A947-70E740481C1C}">
+                <a14:useLocalDpi xmlns:a14="http://schemas.microsoft.com/office/drawing/2010/main" val="0"/>
+              </a:ext>
+            </a:extLst>
+          </a:blip>
+          <a:srcRect/>
+          <a:stretch>
+            <a:fillRect/>
+          </a:stretch>
+        </p:blipFill>
+        <p:spPr bwMode="auto">
+          <a:xfrm>
+            <a:off x="2469312" y="4615788"/>
+            <a:ext cx="549482" cy="549482"/>
+          </a:xfrm>
+          <a:prstGeom prst="rect">
+            <a:avLst/>
+          </a:prstGeom>
+          <a:noFill/>
+          <a:extLst>
+            <a:ext uri="{909E8E84-426E-40DD-AFC4-6F175D3DCCD1}">
+              <a14:hiddenFill xmlns:a14="http://schemas.microsoft.com/office/drawing/2010/main">
+                <a:solidFill>
+                  <a:srgbClr val="FFFFFF"/>
+                </a:solidFill>
+              </a14:hiddenFill>
+            </a:ext>
+          </a:extLst>
+        </p:spPr>
+      </p:pic>
+      <p:sp>
+        <p:nvSpPr>
+          <p:cNvPr id="3" name="TextBox 2">
+            <a:extLst>
+              <a:ext uri="{FF2B5EF4-FFF2-40B4-BE49-F238E27FC236}">
+                <a16:creationId xmlns:a16="http://schemas.microsoft.com/office/drawing/2014/main" id="{8F202A11-8877-474A-85CA-44BC16F36F1C}"/>
+              </a:ext>
+            </a:extLst>
+          </p:cNvPr>
+          <p:cNvSpPr txBox="1"/>
+          <p:nvPr/>
+        </p:nvSpPr>
+        <p:spPr>
+          <a:xfrm>
+            <a:off x="3120550" y="4659696"/>
+            <a:ext cx="8815234" cy="461665"/>
+          </a:xfrm>
+          <a:prstGeom prst="rect">
+            <a:avLst/>
+          </a:prstGeom>
+          <a:noFill/>
+        </p:spPr>
+        <p:txBody>
+          <a:bodyPr wrap="none" rtlCol="0">
+            <a:spAutoFit/>
+          </a:bodyPr>
+          <a:lstStyle/>
+          <a:p>
+            <a:r>
+              <a:rPr lang="de-DE" sz="2400" dirty="0">
+                <a:latin typeface="Raleway" pitchFamily="2" charset="77"/>
+              </a:rPr>
+              <a:t>https://</a:t>
+            </a:r>
+            <a:r>
+              <a:rPr lang="de-DE" sz="2400" dirty="0" err="1">
+                <a:latin typeface="Raleway" pitchFamily="2" charset="77"/>
+              </a:rPr>
+              <a:t>github.com</a:t>
+            </a:r>
+            <a:r>
+              <a:rPr lang="de-DE" sz="2400" dirty="0">
+                <a:latin typeface="Raleway" pitchFamily="2" charset="77"/>
+              </a:rPr>
+              <a:t>/</a:t>
+            </a:r>
+            <a:r>
+              <a:rPr lang="de-DE" sz="2400" dirty="0" err="1">
+                <a:latin typeface="Raleway" pitchFamily="2" charset="77"/>
+              </a:rPr>
+              <a:t>CloudKlabauter</a:t>
+            </a:r>
+            <a:r>
+              <a:rPr lang="de-DE" sz="2400" dirty="0">
+                <a:latin typeface="Raleway" pitchFamily="2" charset="77"/>
+              </a:rPr>
+              <a:t>/</a:t>
+            </a:r>
+            <a:r>
+              <a:rPr lang="de-DE" sz="2400" dirty="0" err="1">
+                <a:latin typeface="Raleway" pitchFamily="2" charset="77"/>
+              </a:rPr>
+              <a:t>HotChocolateWorkshop</a:t>
+            </a:r>
+            <a:endParaRPr lang="de-DE" sz="2400" dirty="0">
+              <a:latin typeface="Raleway" pitchFamily="2" charset="77"/>
+            </a:endParaRPr>
+          </a:p>
+        </p:txBody>
+      </p:sp>
+    </p:spTree>
+    <p:extLst>
+      <p:ext uri="{BB962C8B-B14F-4D97-AF65-F5344CB8AC3E}">
+        <p14:creationId xmlns:p14="http://schemas.microsoft.com/office/powerpoint/2010/main" val="401550812"/>
+      </p:ext>
+    </p:extLst>
+  </p:cSld>
+  <p:clrMapOvr>
+    <a:masterClrMapping/>
+  </p:clrMapOvr>
+</p:sld>
+</file>
+
+<file path=ppt/slides/slide9.xml><?xml version="1.0" encoding="utf-8"?>
+<p:sld xmlns:a="http://schemas.openxmlformats.org/drawingml/2006/main" xmlns:r="http://schemas.openxmlformats.org/officeDocument/2006/relationships" xmlns:p="http://schemas.openxmlformats.org/presentationml/2006/main">
+  <p:cSld>
+    <p:spTree>
+      <p:nvGrpSpPr>
+        <p:cNvPr id="1" name=""/>
+        <p:cNvGrpSpPr/>
+        <p:nvPr/>
+      </p:nvGrpSpPr>
+      <p:grpSpPr>
+        <a:xfrm>
+          <a:off x="0" y="0"/>
+          <a:ext cx="0" cy="0"/>
+          <a:chOff x="0" y="0"/>
+          <a:chExt cx="0" cy="0"/>
+        </a:xfrm>
+      </p:grpSpPr>
+      <p:sp>
+        <p:nvSpPr>
+          <p:cNvPr id="2" name="Titel 1">
+            <a:extLst>
+              <a:ext uri="{FF2B5EF4-FFF2-40B4-BE49-F238E27FC236}">
+                <a16:creationId xmlns:a16="http://schemas.microsoft.com/office/drawing/2014/main" id="{98260182-CA33-48F6-BC1E-03047240F8EC}"/>
+              </a:ext>
+            </a:extLst>
+          </p:cNvPr>
+          <p:cNvSpPr>
+            <a:spLocks noGrp="1"/>
+          </p:cNvSpPr>
+          <p:nvPr>
+            <p:ph type="title"/>
+          </p:nvPr>
+        </p:nvSpPr>
+        <p:spPr/>
+        <p:txBody>
+          <a:bodyPr anchor="b"/>
+          <a:lstStyle/>
+          <a:p>
+            <a:r>
+              <a:rPr lang="de-DE" dirty="0" err="1">
+                <a:solidFill>
+                  <a:schemeClr val="tx1">
+                    <a:lumMod val="75000"/>
+                    <a:lumOff val="25000"/>
+                  </a:schemeClr>
+                </a:solidFill>
+              </a:rPr>
+              <a:t>Questions</a:t>
+            </a:r>
+            <a:r>
+              <a:rPr lang="de-DE" dirty="0">
+                <a:solidFill>
+                  <a:schemeClr val="tx1">
+                    <a:lumMod val="75000"/>
+                    <a:lumOff val="25000"/>
+                  </a:schemeClr>
+                </a:solidFill>
+              </a:rPr>
+              <a:t>?</a:t>
+            </a:r>
+          </a:p>
+        </p:txBody>
+      </p:sp>
+      <p:sp>
+        <p:nvSpPr>
+          <p:cNvPr id="4" name="Datumsplatzhalter 3">
+            <a:extLst>
+              <a:ext uri="{FF2B5EF4-FFF2-40B4-BE49-F238E27FC236}">
+                <a16:creationId xmlns:a16="http://schemas.microsoft.com/office/drawing/2014/main" id="{372D7581-15AB-453A-8172-2DD260D4AD01}"/>
+              </a:ext>
+            </a:extLst>
+          </p:cNvPr>
+          <p:cNvSpPr>
+            <a:spLocks noGrp="1"/>
+          </p:cNvSpPr>
+          <p:nvPr>
+            <p:ph type="dt" sz="half" idx="2"/>
+          </p:nvPr>
+        </p:nvSpPr>
+        <p:spPr>
+          <a:xfrm>
+            <a:off x="526625" y="6356350"/>
+            <a:ext cx="2743200" cy="365125"/>
+          </a:xfrm>
+          <a:prstGeom prst="rect">
+            <a:avLst/>
+          </a:prstGeom>
+        </p:spPr>
+        <p:txBody>
+          <a:bodyPr vert="horz" lIns="91440" tIns="45720" rIns="91440" bIns="45720" rtlCol="0" anchor="ctr"/>
+          <a:lstStyle>
+            <a:lvl1pPr algn="l">
+              <a:defRPr sz="1200">
+                <a:solidFill>
+                  <a:schemeClr val="tx1"/>
+                </a:solidFill>
+              </a:defRPr>
+            </a:lvl1pPr>
+          </a:lstStyle>
+          <a:p>
+            <a:fld id="{95CA576C-67C8-4CE2-9686-DB10934C823F}" type="slidenum">
+              <a:rPr lang="de-DE" b="1" smtClean="0"/>
+              <a:pPr/>
+              <a:t>9</a:t>
             </a:fld>
             <a:r>
               <a:rPr lang="de-DE"/>

</xml_diff>

<commit_message>
Update Slides for challenge 7
</commit_message>
<xml_diff>
--- a/slides/HotChocolate_Part_3.pptx
+++ b/slides/HotChocolate_Part_3.pptx
@@ -205,7 +205,7 @@
           <a:p>
             <a:fld id="{96C061DB-C9A5-E144-8B8D-A9F91D0FE356}" type="datetimeFigureOut">
               <a:rPr lang="de-DE" smtClean="0"/>
-              <a:t>02.12.2021</a:t>
+              <a:t>02.12.21</a:t>
             </a:fld>
             <a:endParaRPr lang="de-DE"/>
           </a:p>
@@ -6836,7 +6836,18 @@
                   </a:schemeClr>
                 </a:solidFill>
               </a:rPr>
-              <a:t>👷‍♂️ Challenge #7: </a:t>
+              <a:t>👷‍♂️ </a:t>
+            </a:r>
+            <a:r>
+              <a:rPr lang="en-US">
+                <a:solidFill>
+                  <a:schemeClr val="tx1">
+                    <a:lumMod val="75000"/>
+                    <a:lumOff val="25000"/>
+                  </a:schemeClr>
+                </a:solidFill>
+              </a:rPr>
+              <a:t>Challenge #6: </a:t>
             </a:r>
             <a:r>
               <a:rPr lang="en-US" dirty="0" err="1">

</xml_diff>